<commit_message>
Retire the idea of swift native implementations in favor of C++
</commit_message>
<xml_diff>
--- a/AV-Native-SDK.pptx
+++ b/AV-Native-SDK.pptx
@@ -263,7 +263,7 @@
           <a:p>
             <a:fld id="{00872148-4BA6-4738-8A8B-AEF1C14E9646}" type="datetimeFigureOut">
               <a:rPr lang="en-US" smtClean="0"/>
-              <a:t>4/15/2025</a:t>
+              <a:t>4/24/2025</a:t>
             </a:fld>
             <a:endParaRPr lang="en-US"/>
           </a:p>
@@ -461,7 +461,7 @@
           <a:p>
             <a:fld id="{00872148-4BA6-4738-8A8B-AEF1C14E9646}" type="datetimeFigureOut">
               <a:rPr lang="en-US" smtClean="0"/>
-              <a:t>4/15/2025</a:t>
+              <a:t>4/24/2025</a:t>
             </a:fld>
             <a:endParaRPr lang="en-US"/>
           </a:p>
@@ -669,7 +669,7 @@
           <a:p>
             <a:fld id="{00872148-4BA6-4738-8A8B-AEF1C14E9646}" type="datetimeFigureOut">
               <a:rPr lang="en-US" smtClean="0"/>
-              <a:t>4/15/2025</a:t>
+              <a:t>4/24/2025</a:t>
             </a:fld>
             <a:endParaRPr lang="en-US"/>
           </a:p>
@@ -867,7 +867,7 @@
           <a:p>
             <a:fld id="{00872148-4BA6-4738-8A8B-AEF1C14E9646}" type="datetimeFigureOut">
               <a:rPr lang="en-US" smtClean="0"/>
-              <a:t>4/15/2025</a:t>
+              <a:t>4/24/2025</a:t>
             </a:fld>
             <a:endParaRPr lang="en-US"/>
           </a:p>
@@ -1142,7 +1142,7 @@
           <a:p>
             <a:fld id="{00872148-4BA6-4738-8A8B-AEF1C14E9646}" type="datetimeFigureOut">
               <a:rPr lang="en-US" smtClean="0"/>
-              <a:t>4/15/2025</a:t>
+              <a:t>4/24/2025</a:t>
             </a:fld>
             <a:endParaRPr lang="en-US"/>
           </a:p>
@@ -1407,7 +1407,7 @@
           <a:p>
             <a:fld id="{00872148-4BA6-4738-8A8B-AEF1C14E9646}" type="datetimeFigureOut">
               <a:rPr lang="en-US" smtClean="0"/>
-              <a:t>4/15/2025</a:t>
+              <a:t>4/24/2025</a:t>
             </a:fld>
             <a:endParaRPr lang="en-US"/>
           </a:p>
@@ -1819,7 +1819,7 @@
           <a:p>
             <a:fld id="{00872148-4BA6-4738-8A8B-AEF1C14E9646}" type="datetimeFigureOut">
               <a:rPr lang="en-US" smtClean="0"/>
-              <a:t>4/15/2025</a:t>
+              <a:t>4/24/2025</a:t>
             </a:fld>
             <a:endParaRPr lang="en-US"/>
           </a:p>
@@ -1960,7 +1960,7 @@
           <a:p>
             <a:fld id="{00872148-4BA6-4738-8A8B-AEF1C14E9646}" type="datetimeFigureOut">
               <a:rPr lang="en-US" smtClean="0"/>
-              <a:t>4/15/2025</a:t>
+              <a:t>4/24/2025</a:t>
             </a:fld>
             <a:endParaRPr lang="en-US"/>
           </a:p>
@@ -2073,7 +2073,7 @@
           <a:p>
             <a:fld id="{00872148-4BA6-4738-8A8B-AEF1C14E9646}" type="datetimeFigureOut">
               <a:rPr lang="en-US" smtClean="0"/>
-              <a:t>4/15/2025</a:t>
+              <a:t>4/24/2025</a:t>
             </a:fld>
             <a:endParaRPr lang="en-US"/>
           </a:p>
@@ -2384,7 +2384,7 @@
           <a:p>
             <a:fld id="{00872148-4BA6-4738-8A8B-AEF1C14E9646}" type="datetimeFigureOut">
               <a:rPr lang="en-US" smtClean="0"/>
-              <a:t>4/15/2025</a:t>
+              <a:t>4/24/2025</a:t>
             </a:fld>
             <a:endParaRPr lang="en-US"/>
           </a:p>
@@ -2672,7 +2672,7 @@
           <a:p>
             <a:fld id="{00872148-4BA6-4738-8A8B-AEF1C14E9646}" type="datetimeFigureOut">
               <a:rPr lang="en-US" smtClean="0"/>
-              <a:t>4/15/2025</a:t>
+              <a:t>4/24/2025</a:t>
             </a:fld>
             <a:endParaRPr lang="en-US"/>
           </a:p>
@@ -2913,7 +2913,7 @@
           <a:p>
             <a:fld id="{00872148-4BA6-4738-8A8B-AEF1C14E9646}" type="datetimeFigureOut">
               <a:rPr lang="en-US" smtClean="0"/>
-              <a:t>4/15/2025</a:t>
+              <a:t>4/24/2025</a:t>
             </a:fld>
             <a:endParaRPr lang="en-US"/>
           </a:p>
@@ -4303,7 +4303,33 @@
                 <a:ea typeface="+mn-ea"/>
                 <a:cs typeface="+mn-cs"/>
               </a:rPr>
-              <a:t> [Pest crate]</a:t>
+              <a:t> [</a:t>
+            </a:r>
+            <a:r>
+              <a:rPr lang="en-US" sz="800" dirty="0">
+                <a:solidFill>
+                  <a:prstClr val="white"/>
+                </a:solidFill>
+                <a:latin typeface="Calibri" panose="020F0502020204030204"/>
+              </a:rPr>
+              <a:t>Rust</a:t>
+            </a:r>
+            <a:r>
+              <a:rPr kumimoji="0" lang="en-US" sz="800" b="0" i="0" u="none" strike="noStrike" kern="1200" cap="none" spc="0" normalizeH="0" baseline="0" noProof="0" dirty="0">
+                <a:ln>
+                  <a:noFill/>
+                </a:ln>
+                <a:solidFill>
+                  <a:prstClr val="white"/>
+                </a:solidFill>
+                <a:effectLst/>
+                <a:uLnTx/>
+                <a:uFillTx/>
+                <a:latin typeface="Calibri" panose="020F0502020204030204"/>
+                <a:ea typeface="+mn-ea"/>
+                <a:cs typeface="+mn-cs"/>
+              </a:rPr>
+              <a:t>]</a:t>
             </a:r>
           </a:p>
         </p:txBody>
@@ -4378,7 +4404,7 @@
                 </a:solidFill>
                 <a:latin typeface="Calibri" panose="020F0502020204030204"/>
               </a:rPr>
-              <a:t>b</a:t>
+              <a:t>av-b</a:t>
             </a:r>
             <a:r>
               <a:rPr kumimoji="0" lang="en-US" sz="1600" b="0" i="0" u="none" strike="noStrike" kern="1200" cap="none" spc="0" normalizeH="0" baseline="0" noProof="0" dirty="0" err="1">
@@ -4412,7 +4438,33 @@
                 <a:ea typeface="+mn-ea"/>
                 <a:cs typeface="+mn-cs"/>
               </a:rPr>
-              <a:t>-blue</a:t>
+              <a:t>-</a:t>
+            </a:r>
+            <a:r>
+              <a:rPr lang="en-US" sz="1600" dirty="0">
+                <a:solidFill>
+                  <a:prstClr val="white"/>
+                </a:solidFill>
+                <a:latin typeface="Calibri" panose="020F0502020204030204"/>
+              </a:rPr>
+              <a:t>svc</a:t>
+            </a:r>
+            <a:r>
+              <a:rPr kumimoji="0" lang="en-US" sz="800" b="0" i="0" u="none" strike="noStrike" kern="1200" cap="none" spc="0" normalizeH="0" baseline="0" noProof="0" dirty="0">
+                <a:ln>
+                  <a:noFill/>
+                </a:ln>
+                <a:solidFill>
+                  <a:prstClr val="white"/>
+                </a:solidFill>
+                <a:effectLst/>
+                <a:uLnTx/>
+                <a:uFillTx/>
+                <a:latin typeface="Calibri" panose="020F0502020204030204"/>
+                <a:ea typeface="+mn-ea"/>
+                <a:cs typeface="+mn-cs"/>
+              </a:rPr>
+              <a:t> [C#]</a:t>
             </a:r>
           </a:p>
         </p:txBody>
@@ -4504,6 +4556,70 @@
               </a:rPr>
               <a:t>v-search</a:t>
             </a:r>
+            <a:endParaRPr kumimoji="0" lang="en-US" sz="800" b="0" i="0" u="none" strike="noStrike" kern="1200" cap="none" spc="0" normalizeH="0" baseline="0" noProof="0" dirty="0">
+              <a:ln>
+                <a:noFill/>
+              </a:ln>
+              <a:solidFill>
+                <a:prstClr val="white"/>
+              </a:solidFill>
+              <a:effectLst/>
+              <a:uLnTx/>
+              <a:uFillTx/>
+              <a:latin typeface="Calibri" panose="020F0502020204030204"/>
+              <a:ea typeface="+mn-ea"/>
+              <a:cs typeface="+mn-cs"/>
+            </a:endParaRPr>
+          </a:p>
+          <a:p>
+            <a:pPr marL="0" marR="0" lvl="0" indent="0" algn="ctr" defTabSz="914400" rtl="0" eaLnBrk="1" fontAlgn="auto" latinLnBrk="0" hangingPunct="1">
+              <a:lnSpc>
+                <a:spcPct val="100000"/>
+              </a:lnSpc>
+              <a:spcBef>
+                <a:spcPts val="0"/>
+              </a:spcBef>
+              <a:spcAft>
+                <a:spcPts val="0"/>
+              </a:spcAft>
+              <a:buClrTx/>
+              <a:buSzTx/>
+              <a:buFontTx/>
+              <a:buNone/>
+              <a:tabLst/>
+              <a:defRPr/>
+            </a:pPr>
+            <a:r>
+              <a:rPr kumimoji="0" lang="en-US" sz="800" b="0" i="0" u="none" strike="noStrike" kern="1200" cap="none" spc="0" normalizeH="0" baseline="0" noProof="0" dirty="0">
+                <a:ln>
+                  <a:noFill/>
+                </a:ln>
+                <a:solidFill>
+                  <a:prstClr val="white"/>
+                </a:solidFill>
+                <a:effectLst/>
+                <a:uLnTx/>
+                <a:uFillTx/>
+                <a:latin typeface="Calibri" panose="020F0502020204030204"/>
+                <a:ea typeface="+mn-ea"/>
+                <a:cs typeface="+mn-cs"/>
+              </a:rPr>
+              <a:t>[C++]</a:t>
+            </a:r>
+            <a:endParaRPr kumimoji="0" lang="en-US" sz="1600" b="0" i="0" u="none" strike="noStrike" kern="1200" cap="none" spc="0" normalizeH="0" baseline="0" noProof="0" dirty="0">
+              <a:ln>
+                <a:noFill/>
+              </a:ln>
+              <a:solidFill>
+                <a:prstClr val="white"/>
+              </a:solidFill>
+              <a:effectLst/>
+              <a:uLnTx/>
+              <a:uFillTx/>
+              <a:latin typeface="Calibri" panose="020F0502020204030204"/>
+              <a:ea typeface="+mn-ea"/>
+              <a:cs typeface="+mn-cs"/>
+            </a:endParaRPr>
           </a:p>
         </p:txBody>
       </p:sp>
@@ -4726,22 +4842,50 @@
                 </a:solidFill>
                 <a:latin typeface="Calibri" panose="020F0502020204030204"/>
               </a:rPr>
-              <a:t>xvmem</a:t>
+              <a:t>Xvmem</a:t>
             </a:r>
-            <a:endParaRPr kumimoji="0" lang="en-US" sz="1600" b="0" i="0" u="none" strike="noStrike" kern="1200" cap="none" spc="0" normalizeH="0" baseline="0" noProof="0" dirty="0">
-              <a:ln>
-                <a:noFill/>
-              </a:ln>
+            <a:endParaRPr lang="en-US" sz="800" dirty="0">
               <a:solidFill>
                 <a:prstClr val="white"/>
               </a:solidFill>
-              <a:effectLst/>
-              <a:uLnTx/>
-              <a:uFillTx/>
               <a:latin typeface="Calibri" panose="020F0502020204030204"/>
-              <a:ea typeface="+mn-ea"/>
-              <a:cs typeface="+mn-cs"/>
             </a:endParaRPr>
+          </a:p>
+          <a:p>
+            <a:pPr marL="0" marR="0" lvl="0" indent="0" algn="ctr" defTabSz="914400" rtl="0" eaLnBrk="1" fontAlgn="auto" latinLnBrk="0" hangingPunct="1">
+              <a:lnSpc>
+                <a:spcPct val="100000"/>
+              </a:lnSpc>
+              <a:spcBef>
+                <a:spcPts val="0"/>
+              </a:spcBef>
+              <a:spcAft>
+                <a:spcPts val="0"/>
+              </a:spcAft>
+              <a:buClrTx/>
+              <a:buSzTx/>
+              <a:buFontTx/>
+              <a:buNone/>
+              <a:tabLst/>
+              <a:defRPr/>
+            </a:pPr>
+            <a:r>
+              <a:rPr kumimoji="0" lang="en-US" sz="800" b="0" i="0" u="none" strike="noStrike" kern="1200" cap="none" spc="0" normalizeH="0" baseline="0" noProof="0" dirty="0">
+                <a:ln>
+                  <a:noFill/>
+                </a:ln>
+                <a:solidFill>
+                  <a:prstClr val="white"/>
+                </a:solidFill>
+                <a:effectLst/>
+                <a:uLnTx/>
+                <a:uFillTx/>
+                <a:latin typeface="Calibri" panose="020F0502020204030204"/>
+                <a:ea typeface="+mn-ea"/>
+                <a:cs typeface="+mn-cs"/>
+              </a:rPr>
+              <a:t>[C++]</a:t>
+            </a:r>
           </a:p>
         </p:txBody>
       </p:sp>
@@ -5233,6 +5377,70 @@
               </a:rPr>
               <a:t>av-foundations</a:t>
             </a:r>
+            <a:endParaRPr kumimoji="0" lang="en-US" sz="800" b="0" i="0" u="none" strike="noStrike" kern="1200" cap="none" spc="0" normalizeH="0" baseline="0" noProof="0" dirty="0">
+              <a:ln>
+                <a:noFill/>
+              </a:ln>
+              <a:solidFill>
+                <a:prstClr val="white"/>
+              </a:solidFill>
+              <a:effectLst/>
+              <a:uLnTx/>
+              <a:uFillTx/>
+              <a:latin typeface="Calibri" panose="020F0502020204030204"/>
+              <a:ea typeface="+mn-ea"/>
+              <a:cs typeface="+mn-cs"/>
+            </a:endParaRPr>
+          </a:p>
+          <a:p>
+            <a:pPr marL="0" marR="0" lvl="0" indent="0" algn="ctr" defTabSz="914400" rtl="0" eaLnBrk="1" fontAlgn="auto" latinLnBrk="0" hangingPunct="1">
+              <a:lnSpc>
+                <a:spcPct val="100000"/>
+              </a:lnSpc>
+              <a:spcBef>
+                <a:spcPts val="0"/>
+              </a:spcBef>
+              <a:spcAft>
+                <a:spcPts val="0"/>
+              </a:spcAft>
+              <a:buClrTx/>
+              <a:buSzTx/>
+              <a:buFontTx/>
+              <a:buNone/>
+              <a:tabLst/>
+              <a:defRPr/>
+            </a:pPr>
+            <a:r>
+              <a:rPr kumimoji="0" lang="en-US" sz="800" b="0" i="0" u="none" strike="noStrike" kern="1200" cap="none" spc="0" normalizeH="0" baseline="0" noProof="0" dirty="0">
+                <a:ln>
+                  <a:noFill/>
+                </a:ln>
+                <a:solidFill>
+                  <a:prstClr val="white"/>
+                </a:solidFill>
+                <a:effectLst/>
+                <a:uLnTx/>
+                <a:uFillTx/>
+                <a:latin typeface="Calibri" panose="020F0502020204030204"/>
+                <a:ea typeface="+mn-ea"/>
+                <a:cs typeface="+mn-cs"/>
+              </a:rPr>
+              <a:t>[C++]</a:t>
+            </a:r>
+            <a:endParaRPr kumimoji="0" lang="en-US" sz="1600" b="0" i="0" u="none" strike="noStrike" kern="1200" cap="none" spc="0" normalizeH="0" baseline="0" noProof="0" dirty="0">
+              <a:ln>
+                <a:noFill/>
+              </a:ln>
+              <a:solidFill>
+                <a:prstClr val="white"/>
+              </a:solidFill>
+              <a:effectLst/>
+              <a:uLnTx/>
+              <a:uFillTx/>
+              <a:latin typeface="Calibri" panose="020F0502020204030204"/>
+              <a:ea typeface="+mn-ea"/>
+              <a:cs typeface="+mn-cs"/>
+            </a:endParaRPr>
           </a:p>
         </p:txBody>
       </p:sp>
@@ -5778,7 +5986,7 @@
         </p:nvGrpSpPr>
         <p:grpSpPr>
           <a:xfrm>
-            <a:off x="1701839" y="5384077"/>
+            <a:off x="1216451" y="5390173"/>
             <a:ext cx="987891" cy="760389"/>
             <a:chOff x="3793406" y="3615014"/>
             <a:chExt cx="1457907" cy="1119069"/>
@@ -6303,13 +6511,15 @@
           </p:cNvPr>
           <p:cNvCxnSpPr>
             <a:cxnSpLocks/>
+            <a:stCxn id="4" idx="2"/>
+            <a:endCxn id="554" idx="0"/>
           </p:cNvCxnSpPr>
           <p:nvPr/>
         </p:nvCxnSpPr>
         <p:spPr>
-          <a:xfrm flipH="1">
-            <a:off x="2392641" y="5708928"/>
-            <a:ext cx="511672" cy="182"/>
+          <a:xfrm rot="16200000" flipH="1">
+            <a:off x="1329263" y="5058943"/>
+            <a:ext cx="761914" cy="2247"/>
           </a:xfrm>
           <a:prstGeom prst="bentConnector3">
             <a:avLst>
@@ -6419,6 +6629,70 @@
               </a:rPr>
               <a:t>av-engine</a:t>
             </a:r>
+            <a:endParaRPr kumimoji="0" lang="en-US" sz="800" b="0" i="0" u="none" strike="noStrike" kern="1200" cap="none" spc="0" normalizeH="0" baseline="0" noProof="0" dirty="0">
+              <a:ln>
+                <a:noFill/>
+              </a:ln>
+              <a:solidFill>
+                <a:prstClr val="white"/>
+              </a:solidFill>
+              <a:effectLst/>
+              <a:uLnTx/>
+              <a:uFillTx/>
+              <a:latin typeface="Calibri" panose="020F0502020204030204"/>
+              <a:ea typeface="+mn-ea"/>
+              <a:cs typeface="+mn-cs"/>
+            </a:endParaRPr>
+          </a:p>
+          <a:p>
+            <a:pPr marL="0" marR="0" lvl="0" indent="0" algn="ctr" defTabSz="914400" rtl="0" eaLnBrk="1" fontAlgn="auto" latinLnBrk="0" hangingPunct="1">
+              <a:lnSpc>
+                <a:spcPct val="100000"/>
+              </a:lnSpc>
+              <a:spcBef>
+                <a:spcPts val="0"/>
+              </a:spcBef>
+              <a:spcAft>
+                <a:spcPts val="0"/>
+              </a:spcAft>
+              <a:buClrTx/>
+              <a:buSzTx/>
+              <a:buFontTx/>
+              <a:buNone/>
+              <a:tabLst/>
+              <a:defRPr/>
+            </a:pPr>
+            <a:r>
+              <a:rPr kumimoji="0" lang="en-US" sz="800" b="0" i="0" u="none" strike="noStrike" kern="1200" cap="none" spc="0" normalizeH="0" baseline="0" noProof="0" dirty="0">
+                <a:ln>
+                  <a:noFill/>
+                </a:ln>
+                <a:solidFill>
+                  <a:prstClr val="white"/>
+                </a:solidFill>
+                <a:effectLst/>
+                <a:uLnTx/>
+                <a:uFillTx/>
+                <a:latin typeface="Calibri" panose="020F0502020204030204"/>
+                <a:ea typeface="+mn-ea"/>
+                <a:cs typeface="+mn-cs"/>
+              </a:rPr>
+              <a:t>[C++]</a:t>
+            </a:r>
+            <a:endParaRPr kumimoji="0" lang="en-US" sz="1600" b="0" i="0" u="none" strike="noStrike" kern="1200" cap="none" spc="0" normalizeH="0" baseline="0" noProof="0" dirty="0">
+              <a:ln>
+                <a:noFill/>
+              </a:ln>
+              <a:solidFill>
+                <a:prstClr val="white"/>
+              </a:solidFill>
+              <a:effectLst/>
+              <a:uLnTx/>
+              <a:uFillTx/>
+              <a:latin typeface="Calibri" panose="020F0502020204030204"/>
+              <a:ea typeface="+mn-ea"/>
+              <a:cs typeface="+mn-cs"/>
+            </a:endParaRPr>
           </a:p>
         </p:txBody>
       </p:sp>
@@ -6471,14 +6745,14 @@
           <p:nvPr>
             <p:extLst>
               <p:ext uri="{D42A27DB-BD31-4B8C-83A1-F6EECF244321}">
-                <p14:modId xmlns:p14="http://schemas.microsoft.com/office/powerpoint/2010/main" val="3748853893"/>
+                <p14:modId xmlns:p14="http://schemas.microsoft.com/office/powerpoint/2010/main" val="1868648830"/>
               </p:ext>
             </p:extLst>
           </p:nvPr>
         </p:nvGraphicFramePr>
         <p:xfrm>
           <a:off x="7892827" y="2804485"/>
-          <a:ext cx="3887065" cy="3337560"/>
+          <a:ext cx="4006565" cy="3337560"/>
         </p:xfrm>
         <a:graphic>
           <a:graphicData uri="http://schemas.openxmlformats.org/drawingml/2006/table">
@@ -6487,21 +6761,21 @@
                 <a:tableStyleId>{5C22544A-7EE6-4342-B048-85BDC9FD1C3A}</a:tableStyleId>
               </a:tblPr>
               <a:tblGrid>
-                <a:gridCol w="1162153">
+                <a:gridCol w="1197881">
                   <a:extLst>
                     <a:ext uri="{9D8B030D-6E8A-4147-A177-3AD203B41FA5}">
                       <a16:colId xmlns:a16="http://schemas.microsoft.com/office/drawing/2014/main" val="1400390802"/>
                     </a:ext>
                   </a:extLst>
                 </a:gridCol>
-                <a:gridCol w="1377696">
+                <a:gridCol w="1420050">
                   <a:extLst>
                     <a:ext uri="{9D8B030D-6E8A-4147-A177-3AD203B41FA5}">
                       <a16:colId xmlns:a16="http://schemas.microsoft.com/office/drawing/2014/main" val="233617351"/>
                     </a:ext>
                   </a:extLst>
                 </a:gridCol>
-                <a:gridCol w="1347216">
+                <a:gridCol w="1388634">
                   <a:extLst>
                     <a:ext uri="{9D8B030D-6E8A-4147-A177-3AD203B41FA5}">
                       <a16:colId xmlns:a16="http://schemas.microsoft.com/office/drawing/2014/main" val="2049259909"/>
@@ -6883,7 +7157,7 @@
                     <a:p>
                       <a:r>
                         <a:rPr lang="en-US" sz="1100" b="1" dirty="0"/>
-                        <a:t>blueprint-blue</a:t>
+                        <a:t>av-blueprint-svc</a:t>
                       </a:r>
                     </a:p>
                   </a:txBody>
@@ -6896,7 +7170,7 @@
                     <a:p>
                       <a:r>
                         <a:rPr lang="en-US" sz="1100" dirty="0"/>
-                        <a:t>swift objects</a:t>
+                        <a:t>null-terminated text</a:t>
                       </a:r>
                     </a:p>
                   </a:txBody>
@@ -6907,10 +7181,32 @@
                     <a:bodyPr/>
                     <a:lstStyle/>
                     <a:p>
+                      <a:pPr marL="0" marR="0" lvl="0" indent="0" algn="l" defTabSz="914400" rtl="0" eaLnBrk="1" fontAlgn="auto" latinLnBrk="0" hangingPunct="1">
+                        <a:lnSpc>
+                          <a:spcPct val="100000"/>
+                        </a:lnSpc>
+                        <a:spcBef>
+                          <a:spcPts val="0"/>
+                        </a:spcBef>
+                        <a:spcAft>
+                          <a:spcPts val="0"/>
+                        </a:spcAft>
+                        <a:buClrTx/>
+                        <a:buSzTx/>
+                        <a:buFontTx/>
+                        <a:buNone/>
+                        <a:tabLst/>
+                        <a:defRPr/>
+                      </a:pPr>
                       <a:r>
                         <a:rPr lang="en-US" sz="1100" dirty="0"/>
-                        <a:t>swift objects</a:t>
+                        <a:t>null-terminated </a:t>
                       </a:r>
+                      <a:r>
+                        <a:rPr lang="en-US" sz="1100" dirty="0" err="1"/>
+                        <a:t>yaml</a:t>
+                      </a:r>
+                      <a:endParaRPr lang="en-US" sz="1100" dirty="0"/>
                     </a:p>
                   </a:txBody>
                   <a:tcPr anchor="ctr"/>
@@ -7061,6 +7357,70 @@
               </a:rPr>
               <a:t>hone</a:t>
             </a:r>
+            <a:endParaRPr kumimoji="0" lang="en-US" sz="800" b="0" i="0" u="none" strike="noStrike" kern="1200" cap="none" spc="0" normalizeH="0" baseline="0" noProof="0" dirty="0">
+              <a:ln>
+                <a:noFill/>
+              </a:ln>
+              <a:solidFill>
+                <a:prstClr val="white"/>
+              </a:solidFill>
+              <a:effectLst/>
+              <a:uLnTx/>
+              <a:uFillTx/>
+              <a:latin typeface="Calibri" panose="020F0502020204030204"/>
+              <a:ea typeface="+mn-ea"/>
+              <a:cs typeface="+mn-cs"/>
+            </a:endParaRPr>
+          </a:p>
+          <a:p>
+            <a:pPr marL="0" marR="0" lvl="0" indent="0" algn="ctr" defTabSz="914400" rtl="0" eaLnBrk="1" fontAlgn="auto" latinLnBrk="0" hangingPunct="1">
+              <a:lnSpc>
+                <a:spcPct val="100000"/>
+              </a:lnSpc>
+              <a:spcBef>
+                <a:spcPts val="0"/>
+              </a:spcBef>
+              <a:spcAft>
+                <a:spcPts val="0"/>
+              </a:spcAft>
+              <a:buClrTx/>
+              <a:buSzTx/>
+              <a:buFontTx/>
+              <a:buNone/>
+              <a:tabLst/>
+              <a:defRPr/>
+            </a:pPr>
+            <a:r>
+              <a:rPr kumimoji="0" lang="en-US" sz="800" b="0" i="0" u="none" strike="noStrike" kern="1200" cap="none" spc="0" normalizeH="0" baseline="0" noProof="0" dirty="0">
+                <a:ln>
+                  <a:noFill/>
+                </a:ln>
+                <a:solidFill>
+                  <a:prstClr val="white"/>
+                </a:solidFill>
+                <a:effectLst/>
+                <a:uLnTx/>
+                <a:uFillTx/>
+                <a:latin typeface="Calibri" panose="020F0502020204030204"/>
+                <a:ea typeface="+mn-ea"/>
+                <a:cs typeface="+mn-cs"/>
+              </a:rPr>
+              <a:t>[C++]</a:t>
+            </a:r>
+            <a:endParaRPr kumimoji="0" lang="en-US" sz="1600" b="0" i="0" u="none" strike="noStrike" kern="1200" cap="none" spc="0" normalizeH="0" baseline="0" noProof="0" dirty="0">
+              <a:ln>
+                <a:noFill/>
+              </a:ln>
+              <a:solidFill>
+                <a:prstClr val="white"/>
+              </a:solidFill>
+              <a:effectLst/>
+              <a:uLnTx/>
+              <a:uFillTx/>
+              <a:latin typeface="Calibri" panose="020F0502020204030204"/>
+              <a:ea typeface="+mn-ea"/>
+              <a:cs typeface="+mn-cs"/>
+            </a:endParaRPr>
           </a:p>
         </p:txBody>
       </p:sp>
@@ -7158,6 +7518,56 @@
                 <a:cs typeface="+mn-cs"/>
               </a:rPr>
               <a:t>misc</a:t>
+            </a:r>
+            <a:endParaRPr kumimoji="0" lang="en-US" sz="800" b="0" i="0" u="none" strike="noStrike" kern="1200" cap="none" spc="0" normalizeH="0" baseline="0" noProof="0" dirty="0">
+              <a:ln>
+                <a:noFill/>
+              </a:ln>
+              <a:solidFill>
+                <a:prstClr val="white"/>
+              </a:solidFill>
+              <a:effectLst/>
+              <a:uLnTx/>
+              <a:uFillTx/>
+              <a:latin typeface="Calibri" panose="020F0502020204030204"/>
+              <a:ea typeface="+mn-ea"/>
+              <a:cs typeface="+mn-cs"/>
+            </a:endParaRPr>
+          </a:p>
+          <a:p>
+            <a:pPr marL="0" marR="0" lvl="0" indent="0" algn="ctr" defTabSz="914400" rtl="0" eaLnBrk="1" fontAlgn="auto" latinLnBrk="0" hangingPunct="1">
+              <a:lnSpc>
+                <a:spcPct val="100000"/>
+              </a:lnSpc>
+              <a:spcBef>
+                <a:spcPts val="0"/>
+              </a:spcBef>
+              <a:spcAft>
+                <a:spcPts val="0"/>
+              </a:spcAft>
+              <a:buClrTx/>
+              <a:buSzTx/>
+              <a:buFontTx/>
+              <a:buNone/>
+              <a:tabLst/>
+              <a:defRPr/>
+            </a:pPr>
+            <a:r>
+              <a:rPr kumimoji="0" lang="en-US" sz="800" b="0" i="0" u="none" strike="noStrike" kern="1200" cap="none" spc="0" normalizeH="0" baseline="0" noProof="0" dirty="0">
+                <a:ln>
+                  <a:noFill/>
+                </a:ln>
+                <a:solidFill>
+                  <a:prstClr val="white"/>
+                </a:solidFill>
+                <a:effectLst/>
+                <a:uLnTx/>
+                <a:uFillTx/>
+                <a:latin typeface="Calibri" panose="020F0502020204030204"/>
+                <a:ea typeface="+mn-ea"/>
+                <a:cs typeface="+mn-cs"/>
+              </a:rPr>
+              <a:t>[C++]</a:t>
             </a:r>
             <a:endParaRPr kumimoji="0" lang="en-US" sz="1600" b="0" i="0" u="none" strike="noStrike" kern="1200" cap="none" spc="0" normalizeH="0" baseline="0" noProof="0" dirty="0">
               <a:ln>
@@ -7274,6 +7684,107 @@
           </a:fontRef>
         </p:style>
       </p:cxnSp>
+      <p:sp>
+        <p:nvSpPr>
+          <p:cNvPr id="6" name="TextBox 5">
+            <a:extLst>
+              <a:ext uri="{FF2B5EF4-FFF2-40B4-BE49-F238E27FC236}">
+                <a16:creationId xmlns:a16="http://schemas.microsoft.com/office/drawing/2014/main" id="{3082CBB4-A5C1-4BC9-4ECF-3379F1931E82}"/>
+              </a:ext>
+            </a:extLst>
+          </p:cNvPr>
+          <p:cNvSpPr txBox="1"/>
+          <p:nvPr/>
+        </p:nvSpPr>
+        <p:spPr>
+          <a:xfrm rot="16200000">
+            <a:off x="3258176" y="4603395"/>
+            <a:ext cx="741133" cy="584775"/>
+          </a:xfrm>
+          <a:prstGeom prst="rect">
+            <a:avLst/>
+          </a:prstGeom>
+          <a:noFill/>
+        </p:spPr>
+        <p:txBody>
+          <a:bodyPr wrap="square" rtlCol="0">
+            <a:spAutoFit/>
+          </a:bodyPr>
+          <a:lstStyle/>
+          <a:p>
+            <a:pPr algn="ctr"/>
+            <a:endParaRPr lang="en-US" sz="800" dirty="0">
+              <a:solidFill>
+                <a:schemeClr val="tx1">
+                  <a:lumMod val="50000"/>
+                  <a:lumOff val="50000"/>
+                </a:schemeClr>
+              </a:solidFill>
+            </a:endParaRPr>
+          </a:p>
+          <a:p>
+            <a:pPr algn="ctr"/>
+            <a:endParaRPr lang="en-US" sz="800" dirty="0">
+              <a:solidFill>
+                <a:schemeClr val="tx1">
+                  <a:lumMod val="50000"/>
+                  <a:lumOff val="50000"/>
+                </a:schemeClr>
+              </a:solidFill>
+            </a:endParaRPr>
+          </a:p>
+          <a:p>
+            <a:pPr algn="ctr"/>
+            <a:r>
+              <a:rPr lang="en-US" sz="800" dirty="0">
+                <a:solidFill>
+                  <a:schemeClr val="tx1">
+                    <a:lumMod val="50000"/>
+                    <a:lumOff val="50000"/>
+                  </a:schemeClr>
+                </a:solidFill>
+              </a:rPr>
+              <a:t>REST</a:t>
+            </a:r>
+          </a:p>
+          <a:p>
+            <a:pPr algn="ctr"/>
+            <a:r>
+              <a:rPr lang="en-US" sz="800" dirty="0">
+                <a:solidFill>
+                  <a:schemeClr val="tx1">
+                    <a:lumMod val="50000"/>
+                    <a:lumOff val="50000"/>
+                  </a:schemeClr>
+                </a:solidFill>
+              </a:rPr>
+              <a:t>(</a:t>
+            </a:r>
+            <a:r>
+              <a:rPr lang="en-US" sz="800" dirty="0" err="1">
+                <a:solidFill>
+                  <a:schemeClr val="tx1">
+                    <a:lumMod val="50000"/>
+                    <a:lumOff val="50000"/>
+                  </a:schemeClr>
+                </a:solidFill>
+              </a:rPr>
+              <a:t>yaml</a:t>
+            </a:r>
+            <a:r>
+              <a:rPr lang="en-US" sz="800" dirty="0">
+                <a:solidFill>
+                  <a:schemeClr val="tx1">
+                    <a:lumMod val="50000"/>
+                    <a:lumOff val="50000"/>
+                  </a:schemeClr>
+                </a:solidFill>
+              </a:rPr>
+              <a:t>)</a:t>
+            </a:r>
+          </a:p>
+        </p:txBody>
+      </p:sp>
     </p:spTree>
     <p:extLst>
       <p:ext uri="{BB962C8B-B14F-4D97-AF65-F5344CB8AC3E}">

</xml_diff>

<commit_message>
Blueprint service is yaml based, not protobuf
</commit_message>
<xml_diff>
--- a/AV-Native-SDK.pptx
+++ b/AV-Native-SDK.pptx
@@ -264,7 +264,7 @@
           <a:p>
             <a:fld id="{00872148-4BA6-4738-8A8B-AEF1C14E9646}" type="datetimeFigureOut">
               <a:rPr lang="en-US" smtClean="0"/>
-              <a:t>4/24/2025</a:t>
+              <a:t>4/26/2025</a:t>
             </a:fld>
             <a:endParaRPr lang="en-US"/>
           </a:p>
@@ -462,7 +462,7 @@
           <a:p>
             <a:fld id="{00872148-4BA6-4738-8A8B-AEF1C14E9646}" type="datetimeFigureOut">
               <a:rPr lang="en-US" smtClean="0"/>
-              <a:t>4/24/2025</a:t>
+              <a:t>4/26/2025</a:t>
             </a:fld>
             <a:endParaRPr lang="en-US"/>
           </a:p>
@@ -670,7 +670,7 @@
           <a:p>
             <a:fld id="{00872148-4BA6-4738-8A8B-AEF1C14E9646}" type="datetimeFigureOut">
               <a:rPr lang="en-US" smtClean="0"/>
-              <a:t>4/24/2025</a:t>
+              <a:t>4/26/2025</a:t>
             </a:fld>
             <a:endParaRPr lang="en-US"/>
           </a:p>
@@ -868,7 +868,7 @@
           <a:p>
             <a:fld id="{00872148-4BA6-4738-8A8B-AEF1C14E9646}" type="datetimeFigureOut">
               <a:rPr lang="en-US" smtClean="0"/>
-              <a:t>4/24/2025</a:t>
+              <a:t>4/26/2025</a:t>
             </a:fld>
             <a:endParaRPr lang="en-US"/>
           </a:p>
@@ -1143,7 +1143,7 @@
           <a:p>
             <a:fld id="{00872148-4BA6-4738-8A8B-AEF1C14E9646}" type="datetimeFigureOut">
               <a:rPr lang="en-US" smtClean="0"/>
-              <a:t>4/24/2025</a:t>
+              <a:t>4/26/2025</a:t>
             </a:fld>
             <a:endParaRPr lang="en-US"/>
           </a:p>
@@ -1408,7 +1408,7 @@
           <a:p>
             <a:fld id="{00872148-4BA6-4738-8A8B-AEF1C14E9646}" type="datetimeFigureOut">
               <a:rPr lang="en-US" smtClean="0"/>
-              <a:t>4/24/2025</a:t>
+              <a:t>4/26/2025</a:t>
             </a:fld>
             <a:endParaRPr lang="en-US"/>
           </a:p>
@@ -1820,7 +1820,7 @@
           <a:p>
             <a:fld id="{00872148-4BA6-4738-8A8B-AEF1C14E9646}" type="datetimeFigureOut">
               <a:rPr lang="en-US" smtClean="0"/>
-              <a:t>4/24/2025</a:t>
+              <a:t>4/26/2025</a:t>
             </a:fld>
             <a:endParaRPr lang="en-US"/>
           </a:p>
@@ -1961,7 +1961,7 @@
           <a:p>
             <a:fld id="{00872148-4BA6-4738-8A8B-AEF1C14E9646}" type="datetimeFigureOut">
               <a:rPr lang="en-US" smtClean="0"/>
-              <a:t>4/24/2025</a:t>
+              <a:t>4/26/2025</a:t>
             </a:fld>
             <a:endParaRPr lang="en-US"/>
           </a:p>
@@ -2074,7 +2074,7 @@
           <a:p>
             <a:fld id="{00872148-4BA6-4738-8A8B-AEF1C14E9646}" type="datetimeFigureOut">
               <a:rPr lang="en-US" smtClean="0"/>
-              <a:t>4/24/2025</a:t>
+              <a:t>4/26/2025</a:t>
             </a:fld>
             <a:endParaRPr lang="en-US"/>
           </a:p>
@@ -2385,7 +2385,7 @@
           <a:p>
             <a:fld id="{00872148-4BA6-4738-8A8B-AEF1C14E9646}" type="datetimeFigureOut">
               <a:rPr lang="en-US" smtClean="0"/>
-              <a:t>4/24/2025</a:t>
+              <a:t>4/26/2025</a:t>
             </a:fld>
             <a:endParaRPr lang="en-US"/>
           </a:p>
@@ -2673,7 +2673,7 @@
           <a:p>
             <a:fld id="{00872148-4BA6-4738-8A8B-AEF1C14E9646}" type="datetimeFigureOut">
               <a:rPr lang="en-US" smtClean="0"/>
-              <a:t>4/24/2025</a:t>
+              <a:t>4/26/2025</a:t>
             </a:fld>
             <a:endParaRPr lang="en-US"/>
           </a:p>
@@ -2914,7 +2914,7 @@
           <a:p>
             <a:fld id="{00872148-4BA6-4738-8A8B-AEF1C14E9646}" type="datetimeFigureOut">
               <a:rPr lang="en-US" smtClean="0"/>
-              <a:t>4/24/2025</a:t>
+              <a:t>4/26/2025</a:t>
             </a:fld>
             <a:endParaRPr lang="en-US"/>
           </a:p>
@@ -3387,9 +3387,10 @@
           </a:p>
           <a:p>
             <a:r>
-              <a:rPr lang="en-US" sz="1800" dirty="0"/>
-              <a:t>4-15-2025</a:t>
+              <a:rPr lang="en-US" sz="1800"/>
+              <a:t>4-26-2025</a:t>
             </a:r>
+            <a:endParaRPr lang="en-US" sz="1800" dirty="0"/>
           </a:p>
         </p:txBody>
       </p:sp>
@@ -7692,7 +7693,7 @@
                 <a:ea typeface="+mn-ea"/>
                 <a:cs typeface="+mn-cs"/>
               </a:rPr>
-              <a:t>Blueprint-Blue-RPC</a:t>
+              <a:t>Blueprint-Blue-SVC</a:t>
             </a:r>
             <a:endParaRPr kumimoji="0" lang="en-US" sz="700" b="0" i="0" u="none" strike="noStrike" kern="1200" cap="none" spc="0" normalizeH="0" baseline="0" noProof="0" dirty="0">
               <a:ln>
@@ -7834,7 +7835,7 @@
           <p:nvPr/>
         </p:nvGrpSpPr>
         <p:grpSpPr>
-          <a:xfrm rot="5400000">
+          <a:xfrm rot="16200000" flipH="1">
             <a:off x="4582958" y="2464053"/>
             <a:ext cx="260145" cy="1567641"/>
             <a:chOff x="9841804" y="4536961"/>
@@ -7899,7 +7900,7 @@
                       </a:schemeClr>
                     </a:solidFill>
                   </a:rPr>
-                  <a:t>protobuf</a:t>
+                  <a:t>yaml</a:t>
                 </a:r>
                 <a:endParaRPr lang="en-US" sz="800" dirty="0">
                   <a:solidFill>
@@ -8004,7 +8005,7 @@
               <a:p>
                 <a:pPr algn="ctr"/>
                 <a:r>
-                  <a:rPr lang="en-US" sz="800" dirty="0" err="1">
+                  <a:rPr lang="en-US" sz="800" dirty="0">
                     <a:solidFill>
                       <a:schemeClr val="tx1">
                         <a:lumMod val="50000"/>
@@ -8012,16 +8013,8 @@
                       </a:schemeClr>
                     </a:solidFill>
                   </a:rPr>
-                  <a:t>protobuf</a:t>
+                  <a:t>text</a:t>
                 </a:r>
-                <a:endParaRPr lang="en-US" sz="800" dirty="0">
-                  <a:solidFill>
-                    <a:schemeClr val="tx1">
-                      <a:lumMod val="50000"/>
-                      <a:lumOff val="50000"/>
-                    </a:schemeClr>
-                  </a:solidFill>
-                </a:endParaRPr>
               </a:p>
             </p:txBody>
           </p:sp>
@@ -8082,8 +8075,8 @@
         </p:nvSpPr>
         <p:spPr>
           <a:xfrm rot="16200000">
-            <a:off x="4437763" y="3010078"/>
-            <a:ext cx="404805" cy="215444"/>
+            <a:off x="4383365" y="3064476"/>
+            <a:ext cx="513602" cy="215444"/>
           </a:xfrm>
           <a:prstGeom prst="rect">
             <a:avLst/>
@@ -8098,7 +8091,7 @@
           <a:p>
             <a:pPr algn="ctr"/>
             <a:r>
-              <a:rPr lang="en-US" sz="800" dirty="0" err="1">
+              <a:rPr lang="en-US" sz="800" dirty="0">
                 <a:solidFill>
                   <a:schemeClr val="tx1">
                     <a:lumMod val="50000"/>
@@ -8106,16 +8099,8 @@
                   </a:schemeClr>
                 </a:solidFill>
               </a:rPr>
-              <a:t>grpc</a:t>
+              <a:t>REST</a:t>
             </a:r>
-            <a:endParaRPr lang="en-US" sz="800" dirty="0">
-              <a:solidFill>
-                <a:schemeClr val="tx1">
-                  <a:lumMod val="50000"/>
-                  <a:lumOff val="50000"/>
-                </a:schemeClr>
-              </a:solidFill>
-            </a:endParaRPr>
           </a:p>
         </p:txBody>
       </p:sp>

</xml_diff>